<commit_message>
CAUSEWAY-3253 : staging changes to website
</commit_message>
<xml_diff>
--- a/content/conguide/latest/_images/contributing/git-workflow.pptx
+++ b/content/conguide/latest/_images/contributing/git-workflow.pptx
@@ -123,10 +123,6 @@
 </p:presentation>
 </file>
 
-<file path=ppt/revisionInfo.xml><?xml version="1.0" encoding="utf-8"?>
-<p1510:revInfo xmlns:a="http://schemas.openxmlformats.org/drawingml/2006/main" xmlns:r="http://schemas.openxmlformats.org/officeDocument/2006/relationships" xmlns:p1510="http://schemas.microsoft.com/office/powerpoint/2015/10/main"/>
-</file>
-
 <file path=ppt/slideLayouts/slideLayout1.xml><?xml version="1.0" encoding="utf-8"?>
 <p:sldLayout xmlns:a="http://schemas.openxmlformats.org/drawingml/2006/main" xmlns:r="http://schemas.openxmlformats.org/officeDocument/2006/relationships" xmlns:p="http://schemas.openxmlformats.org/presentationml/2006/main" type="title" preserve="1">
   <p:cSld name="Title Slide">
@@ -256,7 +252,7 @@
           <a:p>
             <a:fld id="{EA4A70C8-4F78-455D-BEBD-FAD3400884CB}" type="datetimeFigureOut">
               <a:rPr lang="en-US" smtClean="0"/>
-              <a:t>1/4/2018</a:t>
+              <a:t>3/12/2023</a:t>
             </a:fld>
             <a:endParaRPr lang="en-US"/>
           </a:p>
@@ -424,7 +420,7 @@
           <a:p>
             <a:fld id="{EA4A70C8-4F78-455D-BEBD-FAD3400884CB}" type="datetimeFigureOut">
               <a:rPr lang="en-US" smtClean="0"/>
-              <a:t>1/4/2018</a:t>
+              <a:t>3/12/2023</a:t>
             </a:fld>
             <a:endParaRPr lang="en-US"/>
           </a:p>
@@ -602,7 +598,7 @@
           <a:p>
             <a:fld id="{EA4A70C8-4F78-455D-BEBD-FAD3400884CB}" type="datetimeFigureOut">
               <a:rPr lang="en-US" smtClean="0"/>
-              <a:t>1/4/2018</a:t>
+              <a:t>3/12/2023</a:t>
             </a:fld>
             <a:endParaRPr lang="en-US"/>
           </a:p>
@@ -770,7 +766,7 @@
           <a:p>
             <a:fld id="{EA4A70C8-4F78-455D-BEBD-FAD3400884CB}" type="datetimeFigureOut">
               <a:rPr lang="en-US" smtClean="0"/>
-              <a:t>1/4/2018</a:t>
+              <a:t>3/12/2023</a:t>
             </a:fld>
             <a:endParaRPr lang="en-US"/>
           </a:p>
@@ -1015,7 +1011,7 @@
           <a:p>
             <a:fld id="{EA4A70C8-4F78-455D-BEBD-FAD3400884CB}" type="datetimeFigureOut">
               <a:rPr lang="en-US" smtClean="0"/>
-              <a:t>1/4/2018</a:t>
+              <a:t>3/12/2023</a:t>
             </a:fld>
             <a:endParaRPr lang="en-US"/>
           </a:p>
@@ -1244,7 +1240,7 @@
           <a:p>
             <a:fld id="{EA4A70C8-4F78-455D-BEBD-FAD3400884CB}" type="datetimeFigureOut">
               <a:rPr lang="en-US" smtClean="0"/>
-              <a:t>1/4/2018</a:t>
+              <a:t>3/12/2023</a:t>
             </a:fld>
             <a:endParaRPr lang="en-US"/>
           </a:p>
@@ -1608,7 +1604,7 @@
           <a:p>
             <a:fld id="{EA4A70C8-4F78-455D-BEBD-FAD3400884CB}" type="datetimeFigureOut">
               <a:rPr lang="en-US" smtClean="0"/>
-              <a:t>1/4/2018</a:t>
+              <a:t>3/12/2023</a:t>
             </a:fld>
             <a:endParaRPr lang="en-US"/>
           </a:p>
@@ -1725,7 +1721,7 @@
           <a:p>
             <a:fld id="{EA4A70C8-4F78-455D-BEBD-FAD3400884CB}" type="datetimeFigureOut">
               <a:rPr lang="en-US" smtClean="0"/>
-              <a:t>1/4/2018</a:t>
+              <a:t>3/12/2023</a:t>
             </a:fld>
             <a:endParaRPr lang="en-US"/>
           </a:p>
@@ -1820,7 +1816,7 @@
           <a:p>
             <a:fld id="{EA4A70C8-4F78-455D-BEBD-FAD3400884CB}" type="datetimeFigureOut">
               <a:rPr lang="en-US" smtClean="0"/>
-              <a:t>1/4/2018</a:t>
+              <a:t>3/12/2023</a:t>
             </a:fld>
             <a:endParaRPr lang="en-US"/>
           </a:p>
@@ -2095,7 +2091,7 @@
           <a:p>
             <a:fld id="{EA4A70C8-4F78-455D-BEBD-FAD3400884CB}" type="datetimeFigureOut">
               <a:rPr lang="en-US" smtClean="0"/>
-              <a:t>1/4/2018</a:t>
+              <a:t>3/12/2023</a:t>
             </a:fld>
             <a:endParaRPr lang="en-US"/>
           </a:p>
@@ -2347,7 +2343,7 @@
           <a:p>
             <a:fld id="{EA4A70C8-4F78-455D-BEBD-FAD3400884CB}" type="datetimeFigureOut">
               <a:rPr lang="en-US" smtClean="0"/>
-              <a:t>1/4/2018</a:t>
+              <a:t>3/12/2023</a:t>
             </a:fld>
             <a:endParaRPr lang="en-US"/>
           </a:p>
@@ -2558,7 +2554,7 @@
           <a:p>
             <a:fld id="{EA4A70C8-4F78-455D-BEBD-FAD3400884CB}" type="datetimeFigureOut">
               <a:rPr lang="en-US" smtClean="0"/>
-              <a:t>1/4/2018</a:t>
+              <a:t>3/12/2023</a:t>
             </a:fld>
             <a:endParaRPr lang="en-US"/>
           </a:p>
@@ -3007,12 +3003,12 @@
               <a:rPr lang="en-GB" sz="1400" dirty="0"/>
             </a:br>
             <a:r>
-              <a:rPr lang="en-GB" sz="1400" dirty="0"/>
-              <a:t>apache/</a:t>
+              <a:rPr lang="en-GB" sz="1400"/>
+              <a:t>apache/causeway.</a:t>
             </a:r>
             <a:r>
               <a:rPr lang="en-GB" sz="1400" dirty="0" err="1"/>
-              <a:t>isis.git</a:t>
+              <a:t>git</a:t>
             </a:r>
             <a:endParaRPr lang="en-US" sz="1400" dirty="0"/>
           </a:p>
@@ -3059,19 +3055,15 @@
               <a:t>github.com/</a:t>
             </a:r>
             <a:br>
-              <a:rPr lang="en-GB" sz="1400" dirty="0"/>
+              <a:rPr lang="en-GB" sz="1400"/>
             </a:br>
             <a:r>
+              <a:rPr lang="en-GB" sz="1400"/>
+              <a:t>myrepo/causeway.</a:t>
+            </a:r>
+            <a:r>
               <a:rPr lang="en-GB" sz="1400" dirty="0" err="1"/>
-              <a:t>joedeveloper</a:t>
-            </a:r>
-            <a:r>
-              <a:rPr lang="en-GB" sz="1400" dirty="0"/>
-              <a:t>/</a:t>
-            </a:r>
-            <a:r>
-              <a:rPr lang="en-GB" sz="1400" dirty="0" err="1"/>
-              <a:t>isis.git</a:t>
+              <a:t>git</a:t>
             </a:r>
             <a:endParaRPr lang="en-US" sz="1400" dirty="0"/>
           </a:p>

</xml_diff>